<commit_message>
Some changes to prez
</commit_message>
<xml_diff>
--- a/presentation/MilknBread.pptx
+++ b/presentation/MilknBread.pptx
@@ -3043,25 +3043,18 @@
               <a:rPr lang="lv-LV" dirty="0" smtClean="0"/>
               <a:t>Lazda</a:t>
             </a:r>
-            <a:endParaRPr lang="lv-LV" dirty="0" smtClean="0"/>
           </a:p>
           <a:p>
             <a:r>
               <a:rPr lang="lv-LV" dirty="0" smtClean="0"/>
               <a:t>Ernests Auziņš</a:t>
             </a:r>
-            <a:endParaRPr lang="lv-LV" dirty="0" smtClean="0"/>
           </a:p>
           <a:p>
             <a:r>
               <a:rPr lang="lv-LV" dirty="0" smtClean="0"/>
-              <a:t>Jēkabs </a:t>
-            </a:r>
-            <a:r>
-              <a:rPr lang="lv-LV" dirty="0" smtClean="0"/>
-              <a:t>Aizpurvs</a:t>
-            </a:r>
-            <a:endParaRPr lang="lv-LV" dirty="0" smtClean="0"/>
+              <a:t>Jēkabs Aizpurvs</a:t>
+            </a:r>
           </a:p>
         </p:txBody>
       </p:sp>
@@ -3877,6 +3870,10 @@
           <a:bodyPr/>
           <a:lstStyle/>
           <a:p>
+            <a:r>
+              <a:rPr lang="lv-LV" dirty="0" smtClean="0"/>
+              <a:t>Android application et cetera....</a:t>
+            </a:r>
             <a:endParaRPr lang="en-US" dirty="0"/>
           </a:p>
         </p:txBody>

</xml_diff>

<commit_message>
Presentation update + Images
</commit_message>
<xml_diff>
--- a/presentation/MilknBread.pptx
+++ b/presentation/MilknBread.pptx
@@ -7,14 +7,14 @@
   <p:sldIdLst>
     <p:sldId id="256" r:id="rId2"/>
     <p:sldId id="257" r:id="rId3"/>
-    <p:sldId id="267" r:id="rId4"/>
-    <p:sldId id="258" r:id="rId5"/>
-    <p:sldId id="260" r:id="rId6"/>
-    <p:sldId id="262" r:id="rId7"/>
-    <p:sldId id="265" r:id="rId8"/>
-    <p:sldId id="269" r:id="rId9"/>
-    <p:sldId id="268" r:id="rId10"/>
-    <p:sldId id="266" r:id="rId11"/>
+    <p:sldId id="258" r:id="rId4"/>
+    <p:sldId id="260" r:id="rId5"/>
+    <p:sldId id="262" r:id="rId6"/>
+    <p:sldId id="265" r:id="rId7"/>
+    <p:sldId id="269" r:id="rId8"/>
+    <p:sldId id="268" r:id="rId9"/>
+    <p:sldId id="266" r:id="rId10"/>
+    <p:sldId id="270" r:id="rId11"/>
   </p:sldIdLst>
   <p:sldSz cx="12192000" cy="6858000"/>
   <p:notesSz cx="6858000" cy="9144000"/>
@@ -252,7 +252,7 @@
           <a:p>
             <a:fld id="{41DF9119-CC45-4CE0-9A82-A929B1212639}" type="datetimeFigureOut">
               <a:rPr lang="en-US" smtClean="0"/>
-              <a:t>8/24/2017</a:t>
+              <a:t>8/25/2017</a:t>
             </a:fld>
             <a:endParaRPr lang="en-US"/>
           </a:p>
@@ -422,7 +422,7 @@
           <a:p>
             <a:fld id="{41DF9119-CC45-4CE0-9A82-A929B1212639}" type="datetimeFigureOut">
               <a:rPr lang="en-US" smtClean="0"/>
-              <a:t>8/24/2017</a:t>
+              <a:t>8/25/2017</a:t>
             </a:fld>
             <a:endParaRPr lang="en-US"/>
           </a:p>
@@ -602,7 +602,7 @@
           <a:p>
             <a:fld id="{41DF9119-CC45-4CE0-9A82-A929B1212639}" type="datetimeFigureOut">
               <a:rPr lang="en-US" smtClean="0"/>
-              <a:t>8/24/2017</a:t>
+              <a:t>8/25/2017</a:t>
             </a:fld>
             <a:endParaRPr lang="en-US"/>
           </a:p>
@@ -772,7 +772,7 @@
           <a:p>
             <a:fld id="{41DF9119-CC45-4CE0-9A82-A929B1212639}" type="datetimeFigureOut">
               <a:rPr lang="en-US" smtClean="0"/>
-              <a:t>8/24/2017</a:t>
+              <a:t>8/25/2017</a:t>
             </a:fld>
             <a:endParaRPr lang="en-US"/>
           </a:p>
@@ -1018,7 +1018,7 @@
           <a:p>
             <a:fld id="{41DF9119-CC45-4CE0-9A82-A929B1212639}" type="datetimeFigureOut">
               <a:rPr lang="en-US" smtClean="0"/>
-              <a:t>8/24/2017</a:t>
+              <a:t>8/25/2017</a:t>
             </a:fld>
             <a:endParaRPr lang="en-US"/>
           </a:p>
@@ -1250,7 +1250,7 @@
           <a:p>
             <a:fld id="{41DF9119-CC45-4CE0-9A82-A929B1212639}" type="datetimeFigureOut">
               <a:rPr lang="en-US" smtClean="0"/>
-              <a:t>8/24/2017</a:t>
+              <a:t>8/25/2017</a:t>
             </a:fld>
             <a:endParaRPr lang="en-US"/>
           </a:p>
@@ -1617,7 +1617,7 @@
           <a:p>
             <a:fld id="{41DF9119-CC45-4CE0-9A82-A929B1212639}" type="datetimeFigureOut">
               <a:rPr lang="en-US" smtClean="0"/>
-              <a:t>8/24/2017</a:t>
+              <a:t>8/25/2017</a:t>
             </a:fld>
             <a:endParaRPr lang="en-US"/>
           </a:p>
@@ -1735,7 +1735,7 @@
           <a:p>
             <a:fld id="{41DF9119-CC45-4CE0-9A82-A929B1212639}" type="datetimeFigureOut">
               <a:rPr lang="en-US" smtClean="0"/>
-              <a:t>8/24/2017</a:t>
+              <a:t>8/25/2017</a:t>
             </a:fld>
             <a:endParaRPr lang="en-US"/>
           </a:p>
@@ -1830,7 +1830,7 @@
           <a:p>
             <a:fld id="{41DF9119-CC45-4CE0-9A82-A929B1212639}" type="datetimeFigureOut">
               <a:rPr lang="en-US" smtClean="0"/>
-              <a:t>8/24/2017</a:t>
+              <a:t>8/25/2017</a:t>
             </a:fld>
             <a:endParaRPr lang="en-US"/>
           </a:p>
@@ -2107,7 +2107,7 @@
           <a:p>
             <a:fld id="{41DF9119-CC45-4CE0-9A82-A929B1212639}" type="datetimeFigureOut">
               <a:rPr lang="en-US" smtClean="0"/>
-              <a:t>8/24/2017</a:t>
+              <a:t>8/25/2017</a:t>
             </a:fld>
             <a:endParaRPr lang="en-US"/>
           </a:p>
@@ -2360,7 +2360,7 @@
           <a:p>
             <a:fld id="{41DF9119-CC45-4CE0-9A82-A929B1212639}" type="datetimeFigureOut">
               <a:rPr lang="en-US" smtClean="0"/>
-              <a:t>8/24/2017</a:t>
+              <a:t>8/25/2017</a:t>
             </a:fld>
             <a:endParaRPr lang="en-US"/>
           </a:p>
@@ -2573,7 +2573,7 @@
           <a:p>
             <a:fld id="{41DF9119-CC45-4CE0-9A82-A929B1212639}" type="datetimeFigureOut">
               <a:rPr lang="en-US" smtClean="0"/>
-              <a:t>8/24/2017</a:t>
+              <a:t>8/25/2017</a:t>
             </a:fld>
             <a:endParaRPr lang="en-US"/>
           </a:p>
@@ -3000,7 +3000,15 @@
           <a:p>
             <a:r>
               <a:rPr lang="lv-LV" dirty="0" smtClean="0"/>
-              <a:t>Milk ‘n’ Bread</a:t>
+              <a:t>Bread ‘</a:t>
+            </a:r>
+            <a:r>
+              <a:rPr lang="lv-LV" dirty="0"/>
+              <a:t>n</a:t>
+            </a:r>
+            <a:r>
+              <a:rPr lang="lv-LV" dirty="0" smtClean="0"/>
+              <a:t>’ Milk</a:t>
             </a:r>
             <a:endParaRPr lang="en-US" dirty="0"/>
           </a:p>
@@ -3510,13 +3518,8 @@
           <a:p>
             <a:r>
               <a:rPr lang="lv-LV" dirty="0" smtClean="0"/>
-              <a:t>Java </a:t>
-            </a:r>
-            <a:r>
-              <a:rPr lang="lv-LV" dirty="0" smtClean="0"/>
-              <a:t>Bootcamp</a:t>
-            </a:r>
-            <a:endParaRPr lang="lv-LV" dirty="0" smtClean="0"/>
+              <a:t>Java Bootcamp</a:t>
+            </a:r>
           </a:p>
           <a:p>
             <a:r>
@@ -3563,6 +3566,35 @@
           <a:chExt cx="0" cy="0"/>
         </a:xfrm>
       </p:grpSpPr>
+      <p:pic>
+        <p:nvPicPr>
+          <p:cNvPr id="6" name="Picture 5"/>
+          <p:cNvPicPr>
+            <a:picLocks noChangeAspect="1"/>
+          </p:cNvPicPr>
+          <p:nvPr/>
+        </p:nvPicPr>
+        <p:blipFill rotWithShape="1">
+          <a:blip r:embed="rId2">
+            <a:extLst>
+              <a:ext uri="{28A0092B-C50C-407E-A947-70E740481C1C}">
+                <a14:useLocalDpi xmlns:a14="http://schemas.microsoft.com/office/drawing/2010/main" val="0"/>
+              </a:ext>
+            </a:extLst>
+          </a:blip>
+          <a:srcRect l="2149" t="18967" r="1701" b="2347"/>
+          <a:stretch/>
+        </p:blipFill>
+        <p:spPr>
+          <a:xfrm>
+            <a:off x="3477296" y="1292404"/>
+            <a:ext cx="4945487" cy="5396248"/>
+          </a:xfrm>
+          <a:prstGeom prst="rect">
+            <a:avLst/>
+          </a:prstGeom>
+        </p:spPr>
+      </p:pic>
       <p:sp>
         <p:nvSpPr>
           <p:cNvPr id="2" name="Title 1"/>
@@ -3573,55 +3605,21 @@
             <p:ph type="title"/>
           </p:nvPr>
         </p:nvSpPr>
-        <p:spPr/>
-        <p:txBody>
-          <a:bodyPr/>
-          <a:lstStyle/>
-          <a:p>
-            <a:r>
-              <a:rPr lang="en-US" dirty="0"/>
-              <a:t>Future work</a:t>
-            </a:r>
-            <a:br>
-              <a:rPr lang="en-US" dirty="0"/>
-            </a:br>
-            <a:endParaRPr lang="en-US" dirty="0"/>
-          </a:p>
-        </p:txBody>
-      </p:sp>
-      <p:sp>
-        <p:nvSpPr>
-          <p:cNvPr id="3" name="Content Placeholder 2"/>
-          <p:cNvSpPr>
-            <a:spLocks noGrp="1"/>
-          </p:cNvSpPr>
-          <p:nvPr>
-            <p:ph idx="1"/>
-          </p:nvPr>
-        </p:nvSpPr>
-        <p:spPr/>
-        <p:txBody>
-          <a:bodyPr/>
-          <a:lstStyle/>
-          <a:p>
-            <a:r>
-              <a:rPr lang="lv-LV" dirty="0" smtClean="0"/>
-              <a:t>Implement Categories;</a:t>
-            </a:r>
-          </a:p>
-          <a:p>
-            <a:r>
-              <a:rPr lang="lv-LV" dirty="0" smtClean="0"/>
-              <a:t>Get Maxima and other shop prices;</a:t>
-            </a:r>
-          </a:p>
-          <a:p>
-            <a:r>
-              <a:rPr lang="lv-LV" dirty="0" smtClean="0"/>
-              <a:t>Implement multiple user database usage;</a:t>
-            </a:r>
-          </a:p>
-          <a:p>
+        <p:spPr>
+          <a:xfrm>
+            <a:off x="941231" y="326489"/>
+            <a:ext cx="10515600" cy="1325563"/>
+          </a:xfrm>
+        </p:spPr>
+        <p:txBody>
+          <a:bodyPr/>
+          <a:lstStyle/>
+          <a:p>
+            <a:pPr algn="ctr"/>
+            <a:r>
+              <a:rPr lang="lv-LV" dirty="0" smtClean="0"/>
+              <a:t>Thank you for your attention!</a:t>
+            </a:r>
             <a:endParaRPr lang="en-US" dirty="0"/>
           </a:p>
         </p:txBody>
@@ -3629,7 +3627,7 @@
     </p:spTree>
     <p:extLst>
       <p:ext uri="{BB962C8B-B14F-4D97-AF65-F5344CB8AC3E}">
-        <p14:creationId xmlns:p14="http://schemas.microsoft.com/office/powerpoint/2010/main" val="2435937612"/>
+        <p14:creationId xmlns:p14="http://schemas.microsoft.com/office/powerpoint/2010/main" val="1403109904"/>
       </p:ext>
     </p:extLst>
   </p:cSld>
@@ -3708,11 +3706,7 @@
           <a:p>
             <a:r>
               <a:rPr lang="lv-LV" dirty="0" smtClean="0"/>
-              <a:t>Android application </a:t>
-            </a:r>
-            <a:r>
-              <a:rPr lang="lv-LV" dirty="0" smtClean="0"/>
-              <a:t>about grocery shopping list.</a:t>
+              <a:t>Android application about grocery shopping list.</a:t>
             </a:r>
             <a:endParaRPr lang="en-US" dirty="0"/>
           </a:p>
@@ -3755,6 +3749,36 @@
           <a:chExt cx="0" cy="0"/>
         </a:xfrm>
       </p:grpSpPr>
+      <p:pic>
+        <p:nvPicPr>
+          <p:cNvPr id="9" name="Picture 8"/>
+          <p:cNvPicPr>
+            <a:picLocks noChangeAspect="1"/>
+          </p:cNvPicPr>
+          <p:nvPr/>
+        </p:nvPicPr>
+        <p:blipFill>
+          <a:blip r:embed="rId2" cstate="print">
+            <a:extLst>
+              <a:ext uri="{28A0092B-C50C-407E-A947-70E740481C1C}">
+                <a14:useLocalDpi xmlns:a14="http://schemas.microsoft.com/office/drawing/2010/main" val="0"/>
+              </a:ext>
+            </a:extLst>
+          </a:blip>
+          <a:stretch>
+            <a:fillRect/>
+          </a:stretch>
+        </p:blipFill>
+        <p:spPr>
+          <a:xfrm>
+            <a:off x="7375007" y="2645860"/>
+            <a:ext cx="1788544" cy="1788544"/>
+          </a:xfrm>
+          <a:prstGeom prst="rect">
+            <a:avLst/>
+          </a:prstGeom>
+        </p:spPr>
+      </p:pic>
       <p:sp>
         <p:nvSpPr>
           <p:cNvPr id="2" name="Title 1"/>
@@ -3765,13 +3789,20 @@
             <p:ph type="title"/>
           </p:nvPr>
         </p:nvSpPr>
-        <p:spPr/>
-        <p:txBody>
-          <a:bodyPr/>
-          <a:lstStyle/>
-          <a:p>
-            <a:r>
-              <a:rPr lang="lv-LV" dirty="0" smtClean="0"/>
+        <p:spPr>
+          <a:xfrm>
+            <a:off x="838199" y="365125"/>
+            <a:ext cx="4983051" cy="1325563"/>
+          </a:xfrm>
+        </p:spPr>
+        <p:txBody>
+          <a:bodyPr>
+            <a:normAutofit/>
+          </a:bodyPr>
+          <a:lstStyle/>
+          <a:p>
+            <a:r>
+              <a:rPr lang="lv-LV" dirty="0"/>
               <a:t>U</a:t>
             </a:r>
             <a:r>
@@ -3780,47 +3811,492 @@
             </a:r>
             <a:r>
               <a:rPr lang="en-US" dirty="0" smtClean="0"/>
-              <a:t> </a:t>
+              <a:t> tools</a:t>
+            </a:r>
+            <a:endParaRPr lang="en-US" dirty="0"/>
+          </a:p>
+        </p:txBody>
+      </p:sp>
+      <p:sp>
+        <p:nvSpPr>
+          <p:cNvPr id="3" name="Content Placeholder 2"/>
+          <p:cNvSpPr>
+            <a:spLocks noGrp="1"/>
+          </p:cNvSpPr>
+          <p:nvPr>
+            <p:ph idx="1"/>
+          </p:nvPr>
+        </p:nvSpPr>
+        <p:spPr>
+          <a:xfrm>
+            <a:off x="7323786" y="1978025"/>
+            <a:ext cx="4030014" cy="4351338"/>
+          </a:xfrm>
+        </p:spPr>
+        <p:txBody>
+          <a:bodyPr>
+            <a:normAutofit/>
+          </a:bodyPr>
+          <a:lstStyle/>
+          <a:p>
+            <a:r>
+              <a:rPr lang="lv-LV" dirty="0" smtClean="0"/>
+              <a:t>SCRUM</a:t>
+            </a:r>
+          </a:p>
+        </p:txBody>
+      </p:sp>
+      <p:sp>
+        <p:nvSpPr>
+          <p:cNvPr id="4" name="Content Placeholder 2"/>
+          <p:cNvSpPr txBox="1">
+            <a:spLocks/>
+          </p:cNvSpPr>
+          <p:nvPr/>
+        </p:nvSpPr>
+        <p:spPr>
+          <a:xfrm>
+            <a:off x="990600" y="1978025"/>
+            <a:ext cx="4030014" cy="4351338"/>
+          </a:xfrm>
+          <a:prstGeom prst="rect">
+            <a:avLst/>
+          </a:prstGeom>
+        </p:spPr>
+        <p:txBody>
+          <a:bodyPr vert="horz" lIns="91440" tIns="45720" rIns="91440" bIns="45720" rtlCol="0">
+            <a:normAutofit lnSpcReduction="10000"/>
+          </a:bodyPr>
+          <a:lstStyle>
+            <a:lvl1pPr marL="228600" indent="-228600" algn="l" defTabSz="914400" rtl="0" eaLnBrk="1" latinLnBrk="0" hangingPunct="1">
+              <a:lnSpc>
+                <a:spcPct val="90000"/>
+              </a:lnSpc>
+              <a:spcBef>
+                <a:spcPts val="1000"/>
+              </a:spcBef>
+              <a:buFont typeface="Arial" panose="020B0604020202020204" pitchFamily="34" charset="0"/>
+              <a:buChar char="•"/>
+              <a:defRPr sz="2800" kern="1200">
+                <a:solidFill>
+                  <a:schemeClr val="tx1"/>
+                </a:solidFill>
+                <a:latin typeface="+mn-lt"/>
+                <a:ea typeface="+mn-ea"/>
+                <a:cs typeface="+mn-cs"/>
+              </a:defRPr>
+            </a:lvl1pPr>
+            <a:lvl2pPr marL="685800" indent="-228600" algn="l" defTabSz="914400" rtl="0" eaLnBrk="1" latinLnBrk="0" hangingPunct="1">
+              <a:lnSpc>
+                <a:spcPct val="90000"/>
+              </a:lnSpc>
+              <a:spcBef>
+                <a:spcPts val="500"/>
+              </a:spcBef>
+              <a:buFont typeface="Arial" panose="020B0604020202020204" pitchFamily="34" charset="0"/>
+              <a:buChar char="•"/>
+              <a:defRPr sz="2400" kern="1200">
+                <a:solidFill>
+                  <a:schemeClr val="tx1"/>
+                </a:solidFill>
+                <a:latin typeface="+mn-lt"/>
+                <a:ea typeface="+mn-ea"/>
+                <a:cs typeface="+mn-cs"/>
+              </a:defRPr>
+            </a:lvl2pPr>
+            <a:lvl3pPr marL="1143000" indent="-228600" algn="l" defTabSz="914400" rtl="0" eaLnBrk="1" latinLnBrk="0" hangingPunct="1">
+              <a:lnSpc>
+                <a:spcPct val="90000"/>
+              </a:lnSpc>
+              <a:spcBef>
+                <a:spcPts val="500"/>
+              </a:spcBef>
+              <a:buFont typeface="Arial" panose="020B0604020202020204" pitchFamily="34" charset="0"/>
+              <a:buChar char="•"/>
+              <a:defRPr sz="2000" kern="1200">
+                <a:solidFill>
+                  <a:schemeClr val="tx1"/>
+                </a:solidFill>
+                <a:latin typeface="+mn-lt"/>
+                <a:ea typeface="+mn-ea"/>
+                <a:cs typeface="+mn-cs"/>
+              </a:defRPr>
+            </a:lvl3pPr>
+            <a:lvl4pPr marL="1600200" indent="-228600" algn="l" defTabSz="914400" rtl="0" eaLnBrk="1" latinLnBrk="0" hangingPunct="1">
+              <a:lnSpc>
+                <a:spcPct val="90000"/>
+              </a:lnSpc>
+              <a:spcBef>
+                <a:spcPts val="500"/>
+              </a:spcBef>
+              <a:buFont typeface="Arial" panose="020B0604020202020204" pitchFamily="34" charset="0"/>
+              <a:buChar char="•"/>
+              <a:defRPr sz="1800" kern="1200">
+                <a:solidFill>
+                  <a:schemeClr val="tx1"/>
+                </a:solidFill>
+                <a:latin typeface="+mn-lt"/>
+                <a:ea typeface="+mn-ea"/>
+                <a:cs typeface="+mn-cs"/>
+              </a:defRPr>
+            </a:lvl4pPr>
+            <a:lvl5pPr marL="2057400" indent="-228600" algn="l" defTabSz="914400" rtl="0" eaLnBrk="1" latinLnBrk="0" hangingPunct="1">
+              <a:lnSpc>
+                <a:spcPct val="90000"/>
+              </a:lnSpc>
+              <a:spcBef>
+                <a:spcPts val="500"/>
+              </a:spcBef>
+              <a:buFont typeface="Arial" panose="020B0604020202020204" pitchFamily="34" charset="0"/>
+              <a:buChar char="•"/>
+              <a:defRPr sz="1800" kern="1200">
+                <a:solidFill>
+                  <a:schemeClr val="tx1"/>
+                </a:solidFill>
+                <a:latin typeface="+mn-lt"/>
+                <a:ea typeface="+mn-ea"/>
+                <a:cs typeface="+mn-cs"/>
+              </a:defRPr>
+            </a:lvl5pPr>
+            <a:lvl6pPr marL="2514600" indent="-228600" algn="l" defTabSz="914400" rtl="0" eaLnBrk="1" latinLnBrk="0" hangingPunct="1">
+              <a:lnSpc>
+                <a:spcPct val="90000"/>
+              </a:lnSpc>
+              <a:spcBef>
+                <a:spcPts val="500"/>
+              </a:spcBef>
+              <a:buFont typeface="Arial" panose="020B0604020202020204" pitchFamily="34" charset="0"/>
+              <a:buChar char="•"/>
+              <a:defRPr sz="1800" kern="1200">
+                <a:solidFill>
+                  <a:schemeClr val="tx1"/>
+                </a:solidFill>
+                <a:latin typeface="+mn-lt"/>
+                <a:ea typeface="+mn-ea"/>
+                <a:cs typeface="+mn-cs"/>
+              </a:defRPr>
+            </a:lvl6pPr>
+            <a:lvl7pPr marL="2971800" indent="-228600" algn="l" defTabSz="914400" rtl="0" eaLnBrk="1" latinLnBrk="0" hangingPunct="1">
+              <a:lnSpc>
+                <a:spcPct val="90000"/>
+              </a:lnSpc>
+              <a:spcBef>
+                <a:spcPts val="500"/>
+              </a:spcBef>
+              <a:buFont typeface="Arial" panose="020B0604020202020204" pitchFamily="34" charset="0"/>
+              <a:buChar char="•"/>
+              <a:defRPr sz="1800" kern="1200">
+                <a:solidFill>
+                  <a:schemeClr val="tx1"/>
+                </a:solidFill>
+                <a:latin typeface="+mn-lt"/>
+                <a:ea typeface="+mn-ea"/>
+                <a:cs typeface="+mn-cs"/>
+              </a:defRPr>
+            </a:lvl7pPr>
+            <a:lvl8pPr marL="3429000" indent="-228600" algn="l" defTabSz="914400" rtl="0" eaLnBrk="1" latinLnBrk="0" hangingPunct="1">
+              <a:lnSpc>
+                <a:spcPct val="90000"/>
+              </a:lnSpc>
+              <a:spcBef>
+                <a:spcPts val="500"/>
+              </a:spcBef>
+              <a:buFont typeface="Arial" panose="020B0604020202020204" pitchFamily="34" charset="0"/>
+              <a:buChar char="•"/>
+              <a:defRPr sz="1800" kern="1200">
+                <a:solidFill>
+                  <a:schemeClr val="tx1"/>
+                </a:solidFill>
+                <a:latin typeface="+mn-lt"/>
+                <a:ea typeface="+mn-ea"/>
+                <a:cs typeface="+mn-cs"/>
+              </a:defRPr>
+            </a:lvl8pPr>
+            <a:lvl9pPr marL="3886200" indent="-228600" algn="l" defTabSz="914400" rtl="0" eaLnBrk="1" latinLnBrk="0" hangingPunct="1">
+              <a:lnSpc>
+                <a:spcPct val="90000"/>
+              </a:lnSpc>
+              <a:spcBef>
+                <a:spcPts val="500"/>
+              </a:spcBef>
+              <a:buFont typeface="Arial" panose="020B0604020202020204" pitchFamily="34" charset="0"/>
+              <a:buChar char="•"/>
+              <a:defRPr sz="1800" kern="1200">
+                <a:solidFill>
+                  <a:schemeClr val="tx1"/>
+                </a:solidFill>
+                <a:latin typeface="+mn-lt"/>
+                <a:ea typeface="+mn-ea"/>
+                <a:cs typeface="+mn-cs"/>
+              </a:defRPr>
+            </a:lvl9pPr>
+          </a:lstStyle>
+          <a:p>
+            <a:r>
+              <a:rPr lang="lv-LV" dirty="0" smtClean="0"/>
+              <a:t>Java</a:t>
+            </a:r>
+          </a:p>
+          <a:p>
+            <a:r>
+              <a:rPr lang="lv-LV" dirty="0" smtClean="0"/>
+              <a:t>Git</a:t>
+            </a:r>
+          </a:p>
+          <a:p>
+            <a:r>
+              <a:rPr lang="lv-LV" dirty="0" smtClean="0"/>
+              <a:t>Balsamiq Mockup</a:t>
+            </a:r>
+          </a:p>
+          <a:p>
+            <a:r>
+              <a:rPr lang="lv-LV" dirty="0" smtClean="0"/>
+              <a:t>Androdi Studio</a:t>
+            </a:r>
+          </a:p>
+          <a:p>
+            <a:r>
+              <a:rPr lang="lv-LV" dirty="0" smtClean="0"/>
+              <a:t>Mysql Workbench</a:t>
+            </a:r>
+          </a:p>
+          <a:p>
+            <a:r>
+              <a:rPr lang="lv-LV" dirty="0" smtClean="0"/>
+              <a:t>Eclipse</a:t>
+            </a:r>
+          </a:p>
+          <a:p>
+            <a:r>
+              <a:rPr lang="lv-LV" dirty="0" smtClean="0"/>
+              <a:t>PHP</a:t>
+            </a:r>
+          </a:p>
+          <a:p>
+            <a:r>
+              <a:rPr lang="lv-LV" dirty="0" smtClean="0"/>
+              <a:t>Windows/Lubuntu</a:t>
+            </a:r>
+          </a:p>
+          <a:p>
+            <a:r>
+              <a:rPr lang="lv-LV" dirty="0" smtClean="0"/>
+              <a:t>Android 6.0 and Higher</a:t>
+            </a:r>
+          </a:p>
+        </p:txBody>
+      </p:sp>
+      <p:sp>
+        <p:nvSpPr>
+          <p:cNvPr id="5" name="Title 1"/>
+          <p:cNvSpPr txBox="1">
+            <a:spLocks/>
+          </p:cNvSpPr>
+          <p:nvPr/>
+        </p:nvSpPr>
+        <p:spPr>
+          <a:xfrm>
+            <a:off x="6735651" y="365125"/>
+            <a:ext cx="4618149" cy="1325563"/>
+          </a:xfrm>
+          <a:prstGeom prst="rect">
+            <a:avLst/>
+          </a:prstGeom>
+        </p:spPr>
+        <p:txBody>
+          <a:bodyPr vert="horz" lIns="91440" tIns="45720" rIns="91440" bIns="45720" rtlCol="0" anchor="ctr">
+            <a:normAutofit fontScale="85000" lnSpcReduction="10000"/>
+          </a:bodyPr>
+          <a:lstStyle>
+            <a:lvl1pPr algn="l" defTabSz="914400" rtl="0" eaLnBrk="1" latinLnBrk="0" hangingPunct="1">
+              <a:lnSpc>
+                <a:spcPct val="90000"/>
+              </a:lnSpc>
+              <a:spcBef>
+                <a:spcPct val="0"/>
+              </a:spcBef>
+              <a:buNone/>
+              <a:defRPr sz="4400" kern="1200">
+                <a:solidFill>
+                  <a:schemeClr val="tx1"/>
+                </a:solidFill>
+                <a:latin typeface="+mj-lt"/>
+                <a:ea typeface="+mj-ea"/>
+                <a:cs typeface="+mj-cs"/>
+              </a:defRPr>
+            </a:lvl1pPr>
+          </a:lstStyle>
+          <a:p>
+            <a:r>
+              <a:rPr lang="lv-LV" dirty="0"/>
+              <a:t>U</a:t>
+            </a:r>
+            <a:r>
+              <a:rPr lang="en-US" dirty="0" err="1"/>
+              <a:t>sed</a:t>
             </a:r>
             <a:r>
               <a:rPr lang="en-US" dirty="0"/>
-              <a:t>workload management </a:t>
-            </a:r>
-            <a:r>
-              <a:rPr lang="en-US" dirty="0" smtClean="0"/>
-              <a:t>approach</a:t>
-            </a:r>
-            <a:endParaRPr lang="en-US" dirty="0"/>
-          </a:p>
-        </p:txBody>
-      </p:sp>
-      <p:sp>
-        <p:nvSpPr>
-          <p:cNvPr id="3" name="Content Placeholder 2"/>
-          <p:cNvSpPr>
-            <a:spLocks noGrp="1"/>
-          </p:cNvSpPr>
-          <p:nvPr>
-            <p:ph idx="1"/>
-          </p:nvPr>
-        </p:nvSpPr>
-        <p:spPr/>
-        <p:txBody>
-          <a:bodyPr/>
-          <a:lstStyle/>
-          <a:p>
-            <a:r>
-              <a:rPr lang="lv-LV" dirty="0" smtClean="0"/>
-              <a:t>SCRUM</a:t>
-            </a:r>
-            <a:endParaRPr lang="en-US" dirty="0"/>
-          </a:p>
-        </p:txBody>
-      </p:sp>
+              <a:t> workload management approach</a:t>
+            </a:r>
+          </a:p>
+        </p:txBody>
+      </p:sp>
+      <p:pic>
+        <p:nvPicPr>
+          <p:cNvPr id="6" name="Picture 5"/>
+          <p:cNvPicPr>
+            <a:picLocks noChangeAspect="1"/>
+          </p:cNvPicPr>
+          <p:nvPr/>
+        </p:nvPicPr>
+        <p:blipFill>
+          <a:blip r:embed="rId3" cstate="print">
+            <a:extLst>
+              <a:ext uri="{28A0092B-C50C-407E-A947-70E740481C1C}">
+                <a14:useLocalDpi xmlns:a14="http://schemas.microsoft.com/office/drawing/2010/main" val="0"/>
+              </a:ext>
+            </a:extLst>
+          </a:blip>
+          <a:stretch>
+            <a:fillRect/>
+          </a:stretch>
+        </p:blipFill>
+        <p:spPr>
+          <a:xfrm>
+            <a:off x="9715479" y="3239418"/>
+            <a:ext cx="1200407" cy="1200407"/>
+          </a:xfrm>
+          <a:prstGeom prst="rect">
+            <a:avLst/>
+          </a:prstGeom>
+        </p:spPr>
+      </p:pic>
+      <p:pic>
+        <p:nvPicPr>
+          <p:cNvPr id="7" name="Picture 6"/>
+          <p:cNvPicPr>
+            <a:picLocks noChangeAspect="1"/>
+          </p:cNvPicPr>
+          <p:nvPr/>
+        </p:nvPicPr>
+        <p:blipFill>
+          <a:blip r:embed="rId4" cstate="print">
+            <a:extLst>
+              <a:ext uri="{28A0092B-C50C-407E-A947-70E740481C1C}">
+                <a14:useLocalDpi xmlns:a14="http://schemas.microsoft.com/office/drawing/2010/main" val="0"/>
+              </a:ext>
+            </a:extLst>
+          </a:blip>
+          <a:stretch>
+            <a:fillRect/>
+          </a:stretch>
+        </p:blipFill>
+        <p:spPr>
+          <a:xfrm>
+            <a:off x="9908442" y="5021376"/>
+            <a:ext cx="2014888" cy="1611910"/>
+          </a:xfrm>
+          <a:prstGeom prst="rect">
+            <a:avLst/>
+          </a:prstGeom>
+        </p:spPr>
+      </p:pic>
+      <p:pic>
+        <p:nvPicPr>
+          <p:cNvPr id="10" name="Picture 9"/>
+          <p:cNvPicPr>
+            <a:picLocks noChangeAspect="1"/>
+          </p:cNvPicPr>
+          <p:nvPr/>
+        </p:nvPicPr>
+        <p:blipFill>
+          <a:blip r:embed="rId5" cstate="print">
+            <a:extLst>
+              <a:ext uri="{28A0092B-C50C-407E-A947-70E740481C1C}">
+                <a14:useLocalDpi xmlns:a14="http://schemas.microsoft.com/office/drawing/2010/main" val="0"/>
+              </a:ext>
+            </a:extLst>
+          </a:blip>
+          <a:stretch>
+            <a:fillRect/>
+          </a:stretch>
+        </p:blipFill>
+        <p:spPr>
+          <a:xfrm>
+            <a:off x="7237506" y="4683360"/>
+            <a:ext cx="1961104" cy="1961104"/>
+          </a:xfrm>
+          <a:prstGeom prst="rect">
+            <a:avLst/>
+          </a:prstGeom>
+        </p:spPr>
+      </p:pic>
+      <p:pic>
+        <p:nvPicPr>
+          <p:cNvPr id="11" name="Picture 10"/>
+          <p:cNvPicPr>
+            <a:picLocks noChangeAspect="1"/>
+          </p:cNvPicPr>
+          <p:nvPr/>
+        </p:nvPicPr>
+        <p:blipFill>
+          <a:blip r:embed="rId6">
+            <a:extLst>
+              <a:ext uri="{28A0092B-C50C-407E-A947-70E740481C1C}">
+                <a14:useLocalDpi xmlns:a14="http://schemas.microsoft.com/office/drawing/2010/main" val="0"/>
+              </a:ext>
+            </a:extLst>
+          </a:blip>
+          <a:stretch>
+            <a:fillRect/>
+          </a:stretch>
+        </p:blipFill>
+        <p:spPr>
+          <a:xfrm>
+            <a:off x="4867594" y="4153694"/>
+            <a:ext cx="1816589" cy="1816589"/>
+          </a:xfrm>
+          <a:prstGeom prst="rect">
+            <a:avLst/>
+          </a:prstGeom>
+        </p:spPr>
+      </p:pic>
+      <p:pic>
+        <p:nvPicPr>
+          <p:cNvPr id="12" name="Picture 11"/>
+          <p:cNvPicPr>
+            <a:picLocks noChangeAspect="1"/>
+          </p:cNvPicPr>
+          <p:nvPr/>
+        </p:nvPicPr>
+        <p:blipFill>
+          <a:blip r:embed="rId7" cstate="print">
+            <a:extLst>
+              <a:ext uri="{28A0092B-C50C-407E-A947-70E740481C1C}">
+                <a14:useLocalDpi xmlns:a14="http://schemas.microsoft.com/office/drawing/2010/main" val="0"/>
+              </a:ext>
+            </a:extLst>
+          </a:blip>
+          <a:stretch>
+            <a:fillRect/>
+          </a:stretch>
+        </p:blipFill>
+        <p:spPr>
+          <a:xfrm>
+            <a:off x="4444159" y="1957362"/>
+            <a:ext cx="2449669" cy="1837252"/>
+          </a:xfrm>
+          <a:prstGeom prst="rect">
+            <a:avLst/>
+          </a:prstGeom>
+        </p:spPr>
+      </p:pic>
     </p:spTree>
     <p:extLst>
       <p:ext uri="{BB962C8B-B14F-4D97-AF65-F5344CB8AC3E}">
-        <p14:creationId xmlns:p14="http://schemas.microsoft.com/office/powerpoint/2010/main" val="443407286"/>
+        <p14:creationId xmlns:p14="http://schemas.microsoft.com/office/powerpoint/2010/main" val="2244959612"/>
       </p:ext>
     </p:extLst>
   </p:cSld>
@@ -3872,159 +4348,13 @@
           <a:lstStyle/>
           <a:p>
             <a:r>
-              <a:rPr lang="lv-LV" dirty="0"/>
-              <a:t>U</a:t>
-            </a:r>
-            <a:r>
-              <a:rPr lang="en-US" dirty="0" err="1" smtClean="0"/>
-              <a:t>sed</a:t>
+              <a:rPr lang="en-US" dirty="0"/>
+              <a:t>System data </a:t>
             </a:r>
             <a:r>
               <a:rPr lang="en-US" dirty="0" smtClean="0"/>
-              <a:t> tools</a:t>
-            </a:r>
-            <a:endParaRPr lang="en-US" dirty="0"/>
-          </a:p>
-        </p:txBody>
-      </p:sp>
-      <p:sp>
-        <p:nvSpPr>
-          <p:cNvPr id="3" name="Content Placeholder 2"/>
-          <p:cNvSpPr>
-            <a:spLocks noGrp="1"/>
-          </p:cNvSpPr>
-          <p:nvPr>
-            <p:ph idx="1"/>
-          </p:nvPr>
-        </p:nvSpPr>
-        <p:spPr/>
-        <p:txBody>
-          <a:bodyPr>
-            <a:normAutofit lnSpcReduction="10000"/>
-          </a:bodyPr>
-          <a:lstStyle/>
-          <a:p>
-            <a:r>
-              <a:rPr lang="lv-LV" dirty="0" smtClean="0"/>
-              <a:t>Java</a:t>
-            </a:r>
-          </a:p>
-          <a:p>
-            <a:r>
-              <a:rPr lang="lv-LV" dirty="0" smtClean="0"/>
-              <a:t>Git</a:t>
-            </a:r>
-            <a:endParaRPr lang="lv-LV" dirty="0"/>
-          </a:p>
-          <a:p>
-            <a:r>
-              <a:rPr lang="lv-LV" dirty="0" smtClean="0"/>
-              <a:t>Balsamiq Mockup</a:t>
-            </a:r>
-          </a:p>
-          <a:p>
-            <a:r>
-              <a:rPr lang="lv-LV" dirty="0" smtClean="0"/>
-              <a:t>Androdi Studio</a:t>
-            </a:r>
-          </a:p>
-          <a:p>
-            <a:r>
-              <a:rPr lang="lv-LV" dirty="0" smtClean="0"/>
-              <a:t>Mysql Workbench</a:t>
-            </a:r>
-          </a:p>
-          <a:p>
-            <a:r>
-              <a:rPr lang="lv-LV" dirty="0" smtClean="0"/>
-              <a:t>Eclipse</a:t>
-            </a:r>
-          </a:p>
-          <a:p>
-            <a:r>
-              <a:rPr lang="lv-LV" dirty="0" smtClean="0"/>
-              <a:t>PHP</a:t>
-            </a:r>
-          </a:p>
-          <a:p>
-            <a:r>
-              <a:rPr lang="lv-LV" dirty="0" smtClean="0"/>
-              <a:t>Windows/Lubuntu</a:t>
-            </a:r>
-          </a:p>
-          <a:p>
-            <a:r>
-              <a:rPr lang="lv-LV" dirty="0" smtClean="0"/>
-              <a:t>Android 6.0 and </a:t>
-            </a:r>
-            <a:r>
-              <a:rPr lang="lv-LV" dirty="0" smtClean="0"/>
-              <a:t>Higher</a:t>
-            </a:r>
-          </a:p>
-        </p:txBody>
-      </p:sp>
-    </p:spTree>
-    <p:extLst>
-      <p:ext uri="{BB962C8B-B14F-4D97-AF65-F5344CB8AC3E}">
-        <p14:creationId xmlns:p14="http://schemas.microsoft.com/office/powerpoint/2010/main" val="2244959612"/>
-      </p:ext>
-    </p:extLst>
-  </p:cSld>
-  <p:clrMapOvr>
-    <a:masterClrMapping/>
-  </p:clrMapOvr>
-  <p:timing>
-    <p:tnLst>
-      <p:par>
-        <p:cTn id="1" dur="indefinite" restart="never" nodeType="tmRoot"/>
-      </p:par>
-    </p:tnLst>
-  </p:timing>
-</p:sld>
-</file>
-
-<file path=ppt/slides/slide5.xml><?xml version="1.0" encoding="utf-8"?>
-<p:sld xmlns:a="http://schemas.openxmlformats.org/drawingml/2006/main" xmlns:r="http://schemas.openxmlformats.org/officeDocument/2006/relationships" xmlns:p="http://schemas.openxmlformats.org/presentationml/2006/main">
-  <p:cSld>
-    <p:spTree>
-      <p:nvGrpSpPr>
-        <p:cNvPr id="1" name=""/>
-        <p:cNvGrpSpPr/>
-        <p:nvPr/>
-      </p:nvGrpSpPr>
-      <p:grpSpPr>
-        <a:xfrm>
-          <a:off x="0" y="0"/>
-          <a:ext cx="0" cy="0"/>
-          <a:chOff x="0" y="0"/>
-          <a:chExt cx="0" cy="0"/>
-        </a:xfrm>
-      </p:grpSpPr>
-      <p:sp>
-        <p:nvSpPr>
-          <p:cNvPr id="2" name="Title 1"/>
-          <p:cNvSpPr>
-            <a:spLocks noGrp="1"/>
-          </p:cNvSpPr>
-          <p:nvPr>
-            <p:ph type="title"/>
-          </p:nvPr>
-        </p:nvSpPr>
-        <p:spPr/>
-        <p:txBody>
-          <a:bodyPr>
-            <a:normAutofit fontScale="90000"/>
-          </a:bodyPr>
-          <a:lstStyle/>
-          <a:p>
-            <a:r>
-              <a:rPr lang="en-US" dirty="0"/>
-              <a:t>System data model (persistence in general, particularly, database)</a:t>
-            </a:r>
-            <a:br>
-              <a:rPr lang="en-US" dirty="0"/>
-            </a:br>
+              <a:t>model</a:t>
+            </a:r>
             <a:endParaRPr lang="en-US" dirty="0"/>
           </a:p>
         </p:txBody>
@@ -4108,6 +4438,120 @@
 </p:sld>
 </file>
 
+<file path=ppt/slides/slide5.xml><?xml version="1.0" encoding="utf-8"?>
+<p:sld xmlns:a="http://schemas.openxmlformats.org/drawingml/2006/main" xmlns:r="http://schemas.openxmlformats.org/officeDocument/2006/relationships" xmlns:p="http://schemas.openxmlformats.org/presentationml/2006/main">
+  <p:cSld>
+    <p:spTree>
+      <p:nvGrpSpPr>
+        <p:cNvPr id="1" name=""/>
+        <p:cNvGrpSpPr/>
+        <p:nvPr/>
+      </p:nvGrpSpPr>
+      <p:grpSpPr>
+        <a:xfrm>
+          <a:off x="0" y="0"/>
+          <a:ext cx="0" cy="0"/>
+          <a:chOff x="0" y="0"/>
+          <a:chExt cx="0" cy="0"/>
+        </a:xfrm>
+      </p:grpSpPr>
+      <p:sp>
+        <p:nvSpPr>
+          <p:cNvPr id="2" name="Title 1"/>
+          <p:cNvSpPr>
+            <a:spLocks noGrp="1"/>
+          </p:cNvSpPr>
+          <p:nvPr>
+            <p:ph type="title"/>
+          </p:nvPr>
+        </p:nvSpPr>
+        <p:spPr/>
+        <p:txBody>
+          <a:bodyPr>
+            <a:normAutofit/>
+          </a:bodyPr>
+          <a:lstStyle/>
+          <a:p>
+            <a:r>
+              <a:rPr lang="en-US" dirty="0"/>
+              <a:t>System building and </a:t>
+            </a:r>
+            <a:r>
+              <a:rPr lang="en-US" dirty="0" err="1" smtClean="0"/>
+              <a:t>deploymen</a:t>
+            </a:r>
+            <a:r>
+              <a:rPr lang="lv-LV" dirty="0" smtClean="0"/>
+              <a:t>t</a:t>
+            </a:r>
+            <a:r>
+              <a:rPr lang="en-US" dirty="0"/>
+              <a:t/>
+            </a:r>
+            <a:br>
+              <a:rPr lang="en-US" dirty="0"/>
+            </a:br>
+            <a:endParaRPr lang="en-US" dirty="0"/>
+          </a:p>
+        </p:txBody>
+      </p:sp>
+      <p:sp>
+        <p:nvSpPr>
+          <p:cNvPr id="3" name="Content Placeholder 2"/>
+          <p:cNvSpPr>
+            <a:spLocks noGrp="1"/>
+          </p:cNvSpPr>
+          <p:nvPr>
+            <p:ph idx="1"/>
+          </p:nvPr>
+        </p:nvSpPr>
+        <p:spPr/>
+        <p:txBody>
+          <a:bodyPr/>
+          <a:lstStyle/>
+          <a:p>
+            <a:r>
+              <a:rPr lang="lv-LV" dirty="0" smtClean="0"/>
+              <a:t>Manual testing</a:t>
+            </a:r>
+          </a:p>
+          <a:p>
+            <a:r>
+              <a:rPr lang="lv-LV" dirty="0" smtClean="0"/>
+              <a:t>Debuging</a:t>
+            </a:r>
+          </a:p>
+          <a:p>
+            <a:r>
+              <a:rPr lang="lv-LV" dirty="0" smtClean="0"/>
+              <a:t>Junit tests for local DB</a:t>
+            </a:r>
+          </a:p>
+          <a:p>
+            <a:endParaRPr lang="en-US" dirty="0"/>
+          </a:p>
+        </p:txBody>
+      </p:sp>
+    </p:spTree>
+    <p:extLst>
+      <p:ext uri="{BB962C8B-B14F-4D97-AF65-F5344CB8AC3E}">
+        <p14:creationId xmlns:p14="http://schemas.microsoft.com/office/powerpoint/2010/main" val="3082101261"/>
+      </p:ext>
+    </p:extLst>
+  </p:cSld>
+  <p:clrMapOvr>
+    <a:masterClrMapping/>
+  </p:clrMapOvr>
+  <p:timing>
+    <p:tnLst>
+      <p:par>
+        <p:cTn id="1" dur="indefinite" restart="never" nodeType="tmRoot"/>
+      </p:par>
+    </p:tnLst>
+  </p:timing>
+</p:sld>
+</file>
+
 <file path=ppt/slides/slide6.xml><?xml version="1.0" encoding="utf-8"?>
 <p:sld xmlns:a="http://schemas.openxmlformats.org/drawingml/2006/main" xmlns:r="http://schemas.openxmlformats.org/officeDocument/2006/relationships" xmlns:p="http://schemas.openxmlformats.org/presentationml/2006/main">
   <p:cSld>
@@ -4137,26 +4581,12 @@
         </p:nvSpPr>
         <p:spPr/>
         <p:txBody>
-          <a:bodyPr>
-            <a:normAutofit/>
-          </a:bodyPr>
+          <a:bodyPr/>
           <a:lstStyle/>
           <a:p>
             <a:r>
               <a:rPr lang="en-US" dirty="0"/>
-              <a:t>System building and </a:t>
-            </a:r>
-            <a:r>
-              <a:rPr lang="en-US" dirty="0" err="1" smtClean="0"/>
-              <a:t>deploymen</a:t>
-            </a:r>
-            <a:r>
-              <a:rPr lang="lv-LV" dirty="0" smtClean="0"/>
-              <a:t>t</a:t>
-            </a:r>
-            <a:r>
-              <a:rPr lang="en-US" dirty="0"/>
-              <a:t/>
+              <a:t>Final overview:</a:t>
             </a:r>
             <a:br>
               <a:rPr lang="en-US" dirty="0"/>
@@ -4181,21 +4611,78 @@
           <a:lstStyle/>
           <a:p>
             <a:r>
-              <a:rPr lang="lv-LV" dirty="0" smtClean="0"/>
-              <a:t>Manual testing</a:t>
-            </a:r>
-          </a:p>
-          <a:p>
-            <a:r>
-              <a:rPr lang="lv-LV" dirty="0" smtClean="0"/>
-              <a:t>Debuging</a:t>
-            </a:r>
-          </a:p>
-          <a:p>
-            <a:r>
-              <a:rPr lang="lv-LV" dirty="0" smtClean="0"/>
-              <a:t>Junit tests for local DB</a:t>
-            </a:r>
+              <a:rPr lang="en-US" dirty="0"/>
+              <a:t>URL to project resources (if available</a:t>
+            </a:r>
+            <a:r>
+              <a:rPr lang="en-US" dirty="0" smtClean="0"/>
+              <a:t>)</a:t>
+            </a:r>
+            <a:r>
+              <a:rPr lang="lv-LV" dirty="0" smtClean="0"/>
+              <a:t>:</a:t>
+            </a:r>
+          </a:p>
+          <a:p>
+            <a:pPr lvl="1"/>
+            <a:r>
+              <a:rPr lang="en-US" dirty="0">
+                <a:hlinkClick r:id="rId2"/>
+              </a:rPr>
+              <a:t>https://</a:t>
+            </a:r>
+            <a:r>
+              <a:rPr lang="en-US" dirty="0" smtClean="0">
+                <a:hlinkClick r:id="rId2"/>
+              </a:rPr>
+              <a:t>github.com/bricht/piens-un-maize</a:t>
+            </a:r>
+            <a:endParaRPr lang="lv-LV" dirty="0" smtClean="0"/>
+          </a:p>
+          <a:p>
+            <a:pPr lvl="1"/>
+            <a:r>
+              <a:rPr lang="en-US" dirty="0">
+                <a:hlinkClick r:id="rId3"/>
+              </a:rPr>
+              <a:t>https://github.com/ErnestsA/SQLite_Test</a:t>
+            </a:r>
+            <a:r>
+              <a:rPr lang="en-US" dirty="0"/>
+              <a:t> </a:t>
+            </a:r>
+            <a:endParaRPr lang="lv-LV" dirty="0" smtClean="0"/>
+          </a:p>
+          <a:p>
+            <a:pPr lvl="1"/>
+            <a:r>
+              <a:rPr lang="en-US" dirty="0">
+                <a:hlinkClick r:id="rId4"/>
+              </a:rPr>
+              <a:t>https://github.com/LaurisLazda/WebDataReader</a:t>
+            </a:r>
+            <a:endParaRPr lang="en-US" dirty="0"/>
+          </a:p>
+          <a:p>
+            <a:r>
+              <a:rPr lang="en-US" dirty="0"/>
+              <a:t>Main features of the project (which is usually written in something like </a:t>
+            </a:r>
+            <a:r>
+              <a:rPr lang="en-US" b="1" dirty="0"/>
+              <a:t>readme.txt</a:t>
+            </a:r>
+            <a:r>
+              <a:rPr lang="en-US" dirty="0" smtClean="0"/>
+              <a:t>),</a:t>
+            </a:r>
+            <a:endParaRPr lang="en-US" dirty="0"/>
+          </a:p>
+          <a:p>
+            <a:pPr marL="0" indent="0">
+              <a:buNone/>
+            </a:pPr>
+            <a:endParaRPr lang="en-US" dirty="0"/>
           </a:p>
           <a:p>
             <a:endParaRPr lang="en-US" dirty="0"/>
@@ -4205,7 +4692,7 @@
     </p:spTree>
     <p:extLst>
       <p:ext uri="{BB962C8B-B14F-4D97-AF65-F5344CB8AC3E}">
-        <p14:creationId xmlns:p14="http://schemas.microsoft.com/office/powerpoint/2010/main" val="3082101261"/>
+        <p14:creationId xmlns:p14="http://schemas.microsoft.com/office/powerpoint/2010/main" val="27205742"/>
       </p:ext>
     </p:extLst>
   </p:cSld>
@@ -4256,12 +4743,8 @@
           <a:p>
             <a:r>
               <a:rPr lang="en-US" dirty="0"/>
-              <a:t>Final overview:</a:t>
-            </a:r>
-            <a:br>
-              <a:rPr lang="en-US" dirty="0"/>
-            </a:br>
-            <a:endParaRPr lang="en-US" dirty="0"/>
+              <a:t>Biggest challenges in the project and lessons learned</a:t>
+            </a:r>
           </a:p>
         </p:txBody>
       </p:sp>
@@ -4281,88 +4764,43 @@
           <a:lstStyle/>
           <a:p>
             <a:r>
-              <a:rPr lang="en-US" dirty="0"/>
-              <a:t>URL to project resources (if available</a:t>
-            </a:r>
-            <a:r>
-              <a:rPr lang="en-US" dirty="0" smtClean="0"/>
-              <a:t>)</a:t>
-            </a:r>
-            <a:r>
-              <a:rPr lang="lv-LV" dirty="0" smtClean="0"/>
-              <a:t>:</a:t>
-            </a:r>
-          </a:p>
-          <a:p>
-            <a:pPr lvl="1"/>
-            <a:r>
-              <a:rPr lang="en-US" dirty="0">
-                <a:hlinkClick r:id="rId2"/>
-              </a:rPr>
-              <a:t>https://</a:t>
-            </a:r>
-            <a:r>
-              <a:rPr lang="en-US" dirty="0" smtClean="0">
-                <a:hlinkClick r:id="rId2"/>
-              </a:rPr>
-              <a:t>github.com/bricht/piens-un-maize</a:t>
-            </a:r>
+              <a:rPr lang="lv-LV" dirty="0" smtClean="0"/>
+              <a:t>First time Android application development</a:t>
+            </a:r>
+          </a:p>
+          <a:p>
+            <a:r>
+              <a:rPr lang="lv-LV" dirty="0" smtClean="0"/>
+              <a:t>Web scraper</a:t>
+            </a:r>
+          </a:p>
+          <a:p>
+            <a:r>
+              <a:rPr lang="lv-LV" dirty="0" smtClean="0"/>
+              <a:t>Local database (unresolved)</a:t>
+            </a:r>
+          </a:p>
+          <a:p>
+            <a:r>
+              <a:rPr lang="lv-LV" dirty="0" smtClean="0"/>
+              <a:t>Remote database</a:t>
+            </a:r>
+          </a:p>
+          <a:p>
+            <a:r>
+              <a:rPr lang="lv-LV" dirty="0" smtClean="0"/>
+              <a:t>Documentation</a:t>
+            </a:r>
+          </a:p>
+          <a:p>
             <a:endParaRPr lang="lv-LV" dirty="0" smtClean="0"/>
-          </a:p>
-          <a:p>
-            <a:pPr lvl="1"/>
-            <a:r>
-              <a:rPr lang="en-US" dirty="0">
-                <a:hlinkClick r:id="rId3"/>
-              </a:rPr>
-              <a:t>https://github.com/ErnestsA/SQLite_Test</a:t>
-            </a:r>
-            <a:r>
-              <a:rPr lang="en-US" dirty="0"/>
-              <a:t> </a:t>
-            </a:r>
-            <a:endParaRPr lang="lv-LV" dirty="0" smtClean="0"/>
-          </a:p>
-          <a:p>
-            <a:pPr lvl="1"/>
-            <a:r>
-              <a:rPr lang="en-US" dirty="0">
-                <a:hlinkClick r:id="rId4"/>
-              </a:rPr>
-              <a:t>https://github.com/LaurisLazda/WebDataReader</a:t>
-            </a:r>
-            <a:endParaRPr lang="en-US" dirty="0"/>
-          </a:p>
-          <a:p>
-            <a:r>
-              <a:rPr lang="en-US" dirty="0"/>
-              <a:t>Main features of the project (which is usually written in something like </a:t>
-            </a:r>
-            <a:r>
-              <a:rPr lang="en-US" b="1" dirty="0"/>
-              <a:t>readme.txt</a:t>
-            </a:r>
-            <a:r>
-              <a:rPr lang="en-US" dirty="0" smtClean="0"/>
-              <a:t>),</a:t>
-            </a:r>
-            <a:endParaRPr lang="en-US" dirty="0"/>
-          </a:p>
-          <a:p>
-            <a:pPr marL="0" indent="0">
-              <a:buNone/>
-            </a:pPr>
-            <a:endParaRPr lang="en-US" dirty="0"/>
-          </a:p>
-          <a:p>
-            <a:endParaRPr lang="en-US" dirty="0"/>
           </a:p>
         </p:txBody>
       </p:sp>
     </p:spTree>
     <p:extLst>
       <p:ext uri="{BB962C8B-B14F-4D97-AF65-F5344CB8AC3E}">
-        <p14:creationId xmlns:p14="http://schemas.microsoft.com/office/powerpoint/2010/main" val="27205742"/>
+        <p14:creationId xmlns:p14="http://schemas.microsoft.com/office/powerpoint/2010/main" val="778218044"/>
       </p:ext>
     </p:extLst>
   </p:cSld>
@@ -4413,7 +4851,7 @@
           <a:p>
             <a:r>
               <a:rPr lang="en-US" dirty="0"/>
-              <a:t>Biggest challenges in the project and lessons learned</a:t>
+              <a:t>List of team members and their main contribution to project</a:t>
             </a:r>
           </a:p>
         </p:txBody>
@@ -4430,47 +4868,280 @@
         </p:nvSpPr>
         <p:spPr/>
         <p:txBody>
-          <a:bodyPr/>
-          <a:lstStyle/>
-          <a:p>
-            <a:r>
-              <a:rPr lang="lv-LV" dirty="0" smtClean="0"/>
-              <a:t>First time Android application development;</a:t>
-            </a:r>
-          </a:p>
-          <a:p>
-            <a:r>
-              <a:rPr lang="lv-LV" dirty="0" smtClean="0"/>
-              <a:t>Web scraper;</a:t>
-            </a:r>
-          </a:p>
-          <a:p>
-            <a:r>
-              <a:rPr lang="lv-LV" dirty="0" smtClean="0"/>
-              <a:t>Local database (unresolved);</a:t>
-            </a:r>
-          </a:p>
-          <a:p>
-            <a:r>
-              <a:rPr lang="lv-LV" dirty="0" smtClean="0"/>
-              <a:t>Remote database;</a:t>
-            </a:r>
-          </a:p>
-          <a:p>
-            <a:endParaRPr lang="lv-LV" dirty="0" smtClean="0"/>
+          <a:bodyPr>
+            <a:normAutofit lnSpcReduction="10000"/>
+          </a:bodyPr>
+          <a:lstStyle/>
+          <a:p>
+            <a:r>
+              <a:rPr lang="lv-LV" b="1" dirty="0" smtClean="0"/>
+              <a:t>Mārtiņš Klevs </a:t>
+            </a:r>
+            <a:r>
+              <a:rPr lang="lv-LV" dirty="0" smtClean="0"/>
+              <a:t>- </a:t>
+            </a:r>
+            <a:r>
+              <a:rPr lang="lv-LV" i="1" dirty="0" smtClean="0"/>
+              <a:t>Front-end</a:t>
+            </a:r>
+            <a:r>
+              <a:rPr lang="lv-LV" dirty="0" smtClean="0"/>
+              <a:t> </a:t>
+            </a:r>
+            <a:r>
+              <a:rPr lang="lv-LV" dirty="0" smtClean="0"/>
+              <a:t>(search </a:t>
+            </a:r>
+            <a:r>
+              <a:rPr lang="lv-LV" dirty="0" smtClean="0"/>
+              <a:t>activities, </a:t>
+            </a:r>
+            <a:r>
+              <a:rPr lang="lv-LV" dirty="0" smtClean="0"/>
+              <a:t>barcode </a:t>
+            </a:r>
+            <a:r>
+              <a:rPr lang="lv-LV" dirty="0" smtClean="0"/>
+              <a:t>implementation)</a:t>
+            </a:r>
+          </a:p>
+          <a:p>
+            <a:r>
+              <a:rPr lang="lv-LV" b="1" dirty="0"/>
+              <a:t>Guntars </a:t>
+            </a:r>
+            <a:r>
+              <a:rPr lang="lv-LV" b="1" dirty="0" smtClean="0"/>
+              <a:t>Bērziņš </a:t>
+            </a:r>
+            <a:r>
+              <a:rPr lang="lv-LV" dirty="0" smtClean="0"/>
+              <a:t>– </a:t>
+            </a:r>
+            <a:r>
+              <a:rPr lang="lv-LV" i="1" dirty="0" smtClean="0"/>
+              <a:t>Back-end</a:t>
+            </a:r>
+            <a:r>
+              <a:rPr lang="lv-LV" dirty="0" smtClean="0"/>
+              <a:t> (remote database)</a:t>
+            </a:r>
+            <a:endParaRPr lang="lv-LV" dirty="0"/>
+          </a:p>
+          <a:p>
+            <a:r>
+              <a:rPr lang="lv-LV" b="1" dirty="0"/>
+              <a:t>Roberts </a:t>
+            </a:r>
+            <a:r>
+              <a:rPr lang="lv-LV" b="1" dirty="0" smtClean="0"/>
+              <a:t>Stašķevičs </a:t>
+            </a:r>
+            <a:r>
+              <a:rPr lang="lv-LV" dirty="0" smtClean="0"/>
+              <a:t>– </a:t>
+            </a:r>
+            <a:r>
+              <a:rPr lang="lv-LV" i="1" dirty="0" smtClean="0"/>
+              <a:t>Front-end</a:t>
+            </a:r>
+            <a:r>
+              <a:rPr lang="lv-LV" dirty="0" smtClean="0"/>
+              <a:t> (</a:t>
+            </a:r>
+            <a:r>
+              <a:rPr lang="lv-LV" dirty="0" smtClean="0"/>
+              <a:t>UI managment, </a:t>
+            </a:r>
+            <a:r>
+              <a:rPr lang="lv-LV" dirty="0" smtClean="0"/>
+              <a:t>git </a:t>
+            </a:r>
+            <a:r>
+              <a:rPr lang="lv-LV" dirty="0" smtClean="0"/>
+              <a:t>management, </a:t>
+            </a:r>
+            <a:r>
+              <a:rPr lang="lv-LV" dirty="0" smtClean="0"/>
+              <a:t>share </a:t>
+            </a:r>
+            <a:r>
+              <a:rPr lang="lv-LV" dirty="0" smtClean="0"/>
+              <a:t>activity layouts)</a:t>
+            </a:r>
+            <a:endParaRPr lang="lv-LV" dirty="0"/>
+          </a:p>
+          <a:p>
+            <a:r>
+              <a:rPr lang="lv-LV" b="1" dirty="0"/>
+              <a:t>Jānis </a:t>
+            </a:r>
+            <a:r>
+              <a:rPr lang="lv-LV" b="1" dirty="0" smtClean="0"/>
+              <a:t>Lazda </a:t>
+            </a:r>
+            <a:r>
+              <a:rPr lang="lv-LV" dirty="0" smtClean="0"/>
+              <a:t>– </a:t>
+            </a:r>
+            <a:r>
+              <a:rPr lang="lv-LV" i="1" dirty="0" smtClean="0"/>
+              <a:t>Back-end</a:t>
+            </a:r>
+            <a:r>
+              <a:rPr lang="lv-LV" dirty="0" smtClean="0"/>
+              <a:t> </a:t>
+            </a:r>
+            <a:r>
+              <a:rPr lang="lv-LV" dirty="0" smtClean="0"/>
+              <a:t>(web </a:t>
+            </a:r>
+            <a:r>
+              <a:rPr lang="lv-LV" dirty="0"/>
+              <a:t>s</a:t>
+            </a:r>
+            <a:r>
+              <a:rPr lang="lv-LV" dirty="0" smtClean="0"/>
+              <a:t>craper</a:t>
+            </a:r>
+            <a:r>
+              <a:rPr lang="lv-LV" dirty="0" smtClean="0"/>
+              <a:t>, remote database population)</a:t>
+            </a:r>
+            <a:endParaRPr lang="lv-LV" dirty="0"/>
+          </a:p>
+          <a:p>
+            <a:r>
+              <a:rPr lang="lv-LV" b="1" dirty="0"/>
+              <a:t>Lauris </a:t>
+            </a:r>
+            <a:r>
+              <a:rPr lang="lv-LV" b="1" dirty="0" smtClean="0"/>
+              <a:t>Lazda </a:t>
+            </a:r>
+            <a:r>
+              <a:rPr lang="lv-LV" dirty="0" smtClean="0"/>
+              <a:t>– </a:t>
+            </a:r>
+            <a:r>
+              <a:rPr lang="lv-LV" i="1" dirty="0" smtClean="0"/>
+              <a:t>Back-end</a:t>
+            </a:r>
+            <a:r>
+              <a:rPr lang="lv-LV" dirty="0" smtClean="0"/>
+              <a:t> </a:t>
+            </a:r>
+            <a:r>
+              <a:rPr lang="lv-LV" dirty="0" smtClean="0"/>
+              <a:t>(web </a:t>
+            </a:r>
+            <a:r>
+              <a:rPr lang="lv-LV" dirty="0"/>
+              <a:t>s</a:t>
+            </a:r>
+            <a:r>
+              <a:rPr lang="lv-LV" dirty="0" smtClean="0"/>
+              <a:t>craper</a:t>
+            </a:r>
+            <a:r>
+              <a:rPr lang="lv-LV" dirty="0" smtClean="0"/>
+              <a:t>) + </a:t>
+            </a:r>
+            <a:r>
+              <a:rPr lang="lv-LV" i="1" dirty="0" smtClean="0"/>
+              <a:t>Front-end</a:t>
+            </a:r>
+            <a:r>
+              <a:rPr lang="lv-LV" dirty="0" smtClean="0"/>
+              <a:t> </a:t>
+            </a:r>
+            <a:r>
+              <a:rPr lang="lv-LV" dirty="0" smtClean="0"/>
+              <a:t>(shopping </a:t>
+            </a:r>
+            <a:r>
+              <a:rPr lang="lv-LV" dirty="0" smtClean="0"/>
+              <a:t>list activities)</a:t>
+            </a:r>
+            <a:endParaRPr lang="lv-LV" dirty="0"/>
+          </a:p>
+          <a:p>
+            <a:r>
+              <a:rPr lang="lv-LV" b="1" dirty="0"/>
+              <a:t>Ernests </a:t>
+            </a:r>
+            <a:r>
+              <a:rPr lang="lv-LV" b="1" dirty="0" smtClean="0"/>
+              <a:t>Auziņš </a:t>
+            </a:r>
+            <a:r>
+              <a:rPr lang="lv-LV" dirty="0" smtClean="0"/>
+              <a:t>– </a:t>
+            </a:r>
+            <a:r>
+              <a:rPr lang="lv-LV" i="1" dirty="0" smtClean="0"/>
+              <a:t>Back-end</a:t>
+            </a:r>
+            <a:r>
+              <a:rPr lang="lv-LV" dirty="0" smtClean="0"/>
+              <a:t> (local SQLite database)</a:t>
+            </a:r>
+            <a:endParaRPr lang="lv-LV" dirty="0"/>
+          </a:p>
+          <a:p>
+            <a:r>
+              <a:rPr lang="lv-LV" b="1" dirty="0"/>
+              <a:t>Jēkabs </a:t>
+            </a:r>
+            <a:r>
+              <a:rPr lang="lv-LV" b="1" dirty="0" smtClean="0"/>
+              <a:t>Aizpurvs </a:t>
+            </a:r>
+            <a:r>
+              <a:rPr lang="lv-LV" dirty="0" smtClean="0"/>
+              <a:t>– </a:t>
+            </a:r>
+            <a:r>
+              <a:rPr lang="lv-LV" i="1" dirty="0" smtClean="0"/>
+              <a:t>Front-end</a:t>
+            </a:r>
+            <a:r>
+              <a:rPr lang="lv-LV" dirty="0" smtClean="0"/>
+              <a:t> (UI planning and managment, </a:t>
+            </a:r>
+            <a:r>
+              <a:rPr lang="lv-LV" dirty="0" smtClean="0"/>
+              <a:t>favorites </a:t>
+            </a:r>
+            <a:r>
+              <a:rPr lang="lv-LV" dirty="0" smtClean="0"/>
+              <a:t>activities)</a:t>
+            </a:r>
+            <a:endParaRPr lang="lv-LV" dirty="0"/>
+          </a:p>
+          <a:p>
+            <a:endParaRPr lang="en-US" dirty="0"/>
           </a:p>
         </p:txBody>
       </p:sp>
     </p:spTree>
     <p:extLst>
       <p:ext uri="{BB962C8B-B14F-4D97-AF65-F5344CB8AC3E}">
-        <p14:creationId xmlns:p14="http://schemas.microsoft.com/office/powerpoint/2010/main" val="778218044"/>
+        <p14:creationId xmlns:p14="http://schemas.microsoft.com/office/powerpoint/2010/main" val="3265042939"/>
       </p:ext>
     </p:extLst>
   </p:cSld>
   <p:clrMapOvr>
     <a:masterClrMapping/>
   </p:clrMapOvr>
+  <p:timing>
+    <p:tnLst>
+      <p:par>
+        <p:cTn id="1" dur="indefinite" restart="never" nodeType="tmRoot"/>
+      </p:par>
+    </p:tnLst>
+  </p:timing>
 </p:sld>
 </file>
 
@@ -4508,8 +5179,12 @@
           <a:p>
             <a:r>
               <a:rPr lang="en-US" dirty="0"/>
-              <a:t>List of team members and their main contribution to project</a:t>
-            </a:r>
+              <a:t>Future work</a:t>
+            </a:r>
+            <a:br>
+              <a:rPr lang="en-US" dirty="0"/>
+            </a:br>
+            <a:endParaRPr lang="en-US" dirty="0"/>
           </a:p>
         </p:txBody>
       </p:sp>
@@ -4525,81 +5200,31 @@
         </p:nvSpPr>
         <p:spPr/>
         <p:txBody>
-          <a:bodyPr>
-            <a:normAutofit/>
-          </a:bodyPr>
-          <a:lstStyle/>
-          <a:p>
-            <a:r>
-              <a:rPr lang="lv-LV" dirty="0" smtClean="0"/>
-              <a:t>Mārtiņš Klevs - Front-end (Search activities, Barcode implementation)</a:t>
-            </a:r>
-          </a:p>
-          <a:p>
-            <a:r>
-              <a:rPr lang="lv-LV" dirty="0"/>
-              <a:t>Guntars </a:t>
-            </a:r>
-            <a:r>
-              <a:rPr lang="lv-LV" dirty="0" smtClean="0"/>
-              <a:t>Bērziņš – Back-end (remote database)</a:t>
-            </a:r>
-            <a:endParaRPr lang="lv-LV" dirty="0"/>
-          </a:p>
-          <a:p>
-            <a:r>
-              <a:rPr lang="lv-LV" dirty="0"/>
-              <a:t>Roberts </a:t>
-            </a:r>
-            <a:r>
-              <a:rPr lang="lv-LV" dirty="0" smtClean="0"/>
-              <a:t>Stašķevičs – Front-end(UI managment, Git management)</a:t>
-            </a:r>
-            <a:endParaRPr lang="lv-LV" dirty="0"/>
-          </a:p>
-          <a:p>
-            <a:r>
-              <a:rPr lang="lv-LV" dirty="0"/>
-              <a:t>Jānis </a:t>
-            </a:r>
-            <a:r>
-              <a:rPr lang="lv-LV" dirty="0" smtClean="0"/>
-              <a:t>Lazda – Back-end (Web Scraper, remote database population)</a:t>
-            </a:r>
-            <a:endParaRPr lang="lv-LV" dirty="0"/>
-          </a:p>
-          <a:p>
-            <a:r>
-              <a:rPr lang="lv-LV" dirty="0"/>
-              <a:t>Lauris </a:t>
-            </a:r>
-            <a:r>
-              <a:rPr lang="lv-LV" dirty="0" smtClean="0"/>
-              <a:t>Lazda – Back-end (Web Scraper) + Front-end (Shopping list activities)</a:t>
-            </a:r>
-            <a:endParaRPr lang="lv-LV" dirty="0"/>
-          </a:p>
-          <a:p>
-            <a:r>
-              <a:rPr lang="lv-LV" dirty="0"/>
-              <a:t>Ernests </a:t>
-            </a:r>
-            <a:r>
-              <a:rPr lang="lv-LV" dirty="0" smtClean="0"/>
-              <a:t>Auziņš – Back-end (local SQLite database)</a:t>
-            </a:r>
-            <a:endParaRPr lang="lv-LV" dirty="0"/>
-          </a:p>
-          <a:p>
-            <a:r>
-              <a:rPr lang="lv-LV" dirty="0"/>
-              <a:t>Jēkabs </a:t>
-            </a:r>
-            <a:r>
-              <a:rPr lang="lv-LV" dirty="0" smtClean="0"/>
-              <a:t>Aizpurvs – Front-end (UI planning and managment, Favorites activities)</a:t>
-            </a:r>
-            <a:endParaRPr lang="lv-LV" dirty="0"/>
+          <a:bodyPr/>
+          <a:lstStyle/>
+          <a:p>
+            <a:r>
+              <a:rPr lang="lv-LV" dirty="0" smtClean="0"/>
+              <a:t>Implement Categories;</a:t>
+            </a:r>
+          </a:p>
+          <a:p>
+            <a:r>
+              <a:rPr lang="lv-LV" dirty="0" smtClean="0"/>
+              <a:t>Get Maxima and other shop prices;</a:t>
+            </a:r>
+          </a:p>
+          <a:p>
+            <a:r>
+              <a:rPr lang="lv-LV" dirty="0" smtClean="0"/>
+              <a:t>Implement multiple user database usage;</a:t>
+            </a:r>
+          </a:p>
+          <a:p>
+            <a:r>
+              <a:rPr lang="lv-LV" dirty="0" smtClean="0"/>
+              <a:t>Sort list of products by price;</a:t>
+            </a:r>
           </a:p>
           <a:p>
             <a:endParaRPr lang="en-US" dirty="0"/>
@@ -4609,13 +5234,20 @@
     </p:spTree>
     <p:extLst>
       <p:ext uri="{BB962C8B-B14F-4D97-AF65-F5344CB8AC3E}">
-        <p14:creationId xmlns:p14="http://schemas.microsoft.com/office/powerpoint/2010/main" val="3265042939"/>
+        <p14:creationId xmlns:p14="http://schemas.microsoft.com/office/powerpoint/2010/main" val="2435937612"/>
       </p:ext>
     </p:extLst>
   </p:cSld>
   <p:clrMapOvr>
     <a:masterClrMapping/>
   </p:clrMapOvr>
+  <p:timing>
+    <p:tnLst>
+      <p:par>
+        <p:cTn id="1" dur="indefinite" restart="never" nodeType="tmRoot"/>
+      </p:par>
+    </p:tnLst>
+  </p:timing>
 </p:sld>
 </file>
 

</xml_diff>